<commit_message>
Example counter website using nodejs and redis
</commit_message>
<xml_diff>
--- a/Docker - 03 - Build a Custom Images Through Docker.pptx
+++ b/Docker - 03 - Build a Custom Images Through Docker.pptx
@@ -17571,7 +17571,7 @@
       </p:sp>
       <p:pic>
         <p:nvPicPr>
-          <p:cNvPr id="1" name="Picture 0"/>
+          <p:cNvPr id="2" name="Picture 1"/>
           <p:cNvPicPr>
             <a:picLocks noChangeAspect="1"/>
           </p:cNvPicPr>
@@ -18149,7 +18149,7 @@
       </p:sp>
       <p:pic>
         <p:nvPicPr>
-          <p:cNvPr id="1" name="Picture 0"/>
+          <p:cNvPr id="2" name="Picture 1"/>
           <p:cNvPicPr>
             <a:picLocks noChangeAspect="1"/>
           </p:cNvPicPr>
@@ -18443,7 +18443,7 @@
               <a:rPr lang="en-US" altLang="en-GB" b="1">
                 <a:sym typeface="+mn-ea"/>
               </a:rPr>
-              <a:t>stop docker compose</a:t>
+              <a:t>Maintaince the container in cases crash or error</a:t>
             </a:r>
             <a:endParaRPr lang="en-US" b="1">
               <a:solidFill>
@@ -18453,30 +18453,6 @@
           </a:p>
         </p:txBody>
       </p:sp>
-      <p:pic>
-        <p:nvPicPr>
-          <p:cNvPr id="1" name="Picture 0"/>
-          <p:cNvPicPr>
-            <a:picLocks noChangeAspect="1"/>
-          </p:cNvPicPr>
-          <p:nvPr/>
-        </p:nvPicPr>
-        <p:blipFill>
-          <a:blip r:embed="rId1"/>
-          <a:stretch>
-            <a:fillRect/>
-          </a:stretch>
-        </p:blipFill>
-        <p:spPr>
-          <a:xfrm>
-            <a:off x="4051935" y="925830"/>
-            <a:ext cx="4636135" cy="4217670"/>
-          </a:xfrm>
-          <a:prstGeom prst="rect">
-            <a:avLst/>
-          </a:prstGeom>
-        </p:spPr>
-      </p:pic>
     </p:spTree>
   </p:cSld>
   <p:clrMapOvr>

</xml_diff>